<commit_message>
lab #4 with better example code
</commit_message>
<xml_diff>
--- a/classes/prog2019/Lab04.pptx
+++ b/classes/prog2019/Lab04.pptx
@@ -681,7 +681,7 @@
             </a:extLst>
           </p:cNvPr>
           <p:cNvSpPr>
-            <a:spLocks noChangeArrowheads="1" noTextEdit="1"/>
+            <a:spLocks noGrp="1" noRot="1" noChangeAspect="1" noChangeArrowheads="1" noTextEdit="1"/>
           </p:cNvSpPr>
           <p:nvPr>
             <p:ph type="sldImg"/>
@@ -704,7 +704,7 @@
             </a:extLst>
           </p:cNvPr>
           <p:cNvSpPr>
-            <a:spLocks noChangeArrowheads="1"/>
+            <a:spLocks noGrp="1" noChangeArrowheads="1"/>
           </p:cNvSpPr>
           <p:nvPr>
             <p:ph type="body" idx="1"/>
@@ -938,7 +938,7 @@
             </a:extLst>
           </p:cNvPr>
           <p:cNvSpPr>
-            <a:spLocks noChangeArrowheads="1" noTextEdit="1"/>
+            <a:spLocks noGrp="1" noRot="1" noChangeAspect="1" noChangeArrowheads="1" noTextEdit="1"/>
           </p:cNvSpPr>
           <p:nvPr>
             <p:ph type="sldImg"/>
@@ -961,7 +961,7 @@
             </a:extLst>
           </p:cNvPr>
           <p:cNvSpPr>
-            <a:spLocks noChangeArrowheads="1"/>
+            <a:spLocks noGrp="1" noChangeArrowheads="1"/>
           </p:cNvSpPr>
           <p:nvPr>
             <p:ph type="body" idx="1"/>
@@ -5441,7 +5441,7 @@
           <a:graphicData uri="http://schemas.openxmlformats.org/presentationml/2006/ole">
             <mc:AlternateContent xmlns:mc="http://schemas.openxmlformats.org/markup-compatibility/2006">
               <mc:Choice xmlns:v="urn:schemas-microsoft-com:vml" Requires="v">
-                <p:oleObj spid="_x0000_s1029" name="Bitmap Image" r:id="rId4" imgW="10657143" imgH="5761905" progId="Paint.Picture">
+                <p:oleObj spid="_x0000_s1033" name="Bitmap Image" r:id="rId4" imgW="10657143" imgH="5761905" progId="Paint.Picture">
                   <p:embed/>
                 </p:oleObj>
               </mc:Choice>
@@ -5609,7 +5609,7 @@
           <a:graphicData uri="http://schemas.openxmlformats.org/presentationml/2006/ole">
             <mc:AlternateContent xmlns:mc="http://schemas.openxmlformats.org/markup-compatibility/2006">
               <mc:Choice xmlns:v="urn:schemas-microsoft-com:vml" Requires="v">
-                <p:oleObj spid="_x0000_s2056" name="Bitmap Image" r:id="rId4" imgW="5477640" imgH="2638095" progId="Paint.Picture">
+                <p:oleObj spid="_x0000_s2064" name="Bitmap Image" r:id="rId4" imgW="5477640" imgH="2638095" progId="Paint.Picture">
                   <p:embed/>
                 </p:oleObj>
               </mc:Choice>
@@ -5901,7 +5901,7 @@
           <a:graphicData uri="http://schemas.openxmlformats.org/presentationml/2006/ole">
             <mc:AlternateContent xmlns:mc="http://schemas.openxmlformats.org/markup-compatibility/2006">
               <mc:Choice xmlns:v="urn:schemas-microsoft-com:vml" Requires="v">
-                <p:oleObj spid="_x0000_s2057" name="Bitmap Image" r:id="rId6" imgW="666667" imgH="819048" progId="Paint.Picture">
+                <p:oleObj spid="_x0000_s2065" name="Bitmap Image" r:id="rId6" imgW="666667" imgH="819048" progId="Paint.Picture">
                   <p:embed/>
                 </p:oleObj>
               </mc:Choice>
@@ -6009,6 +6009,36 @@
           <a:chExt cx="0" cy="0"/>
         </a:xfrm>
       </p:grpSpPr>
+      <p:pic>
+        <p:nvPicPr>
+          <p:cNvPr id="2" name="Picture 1">
+            <a:extLst>
+              <a:ext uri="{FF2B5EF4-FFF2-40B4-BE49-F238E27FC236}">
+                <a16:creationId xmlns:a16="http://schemas.microsoft.com/office/drawing/2014/main" id="{2F60AB78-BA3C-4B25-9C1E-78AA9A085E8B}"/>
+              </a:ext>
+            </a:extLst>
+          </p:cNvPr>
+          <p:cNvPicPr>
+            <a:picLocks noChangeAspect="1"/>
+          </p:cNvPicPr>
+          <p:nvPr/>
+        </p:nvPicPr>
+        <p:blipFill>
+          <a:blip r:embed="rId2"/>
+          <a:stretch>
+            <a:fillRect/>
+          </a:stretch>
+        </p:blipFill>
+        <p:spPr>
+          <a:xfrm>
+            <a:off x="628649" y="995362"/>
+            <a:ext cx="6742643" cy="3957638"/>
+          </a:xfrm>
+          <a:prstGeom prst="rect">
+            <a:avLst/>
+          </a:prstGeom>
+        </p:spPr>
+      </p:pic>
       <p:sp>
         <p:nvSpPr>
           <p:cNvPr id="17410" name="TextBox 1">
@@ -6196,292 +6226,6 @@
           </a:p>
         </p:txBody>
       </p:sp>
-      <p:pic>
-        <p:nvPicPr>
-          <p:cNvPr id="17411" name="Picture 2">
-            <a:extLst>
-              <a:ext uri="{FF2B5EF4-FFF2-40B4-BE49-F238E27FC236}">
-                <a16:creationId xmlns:a16="http://schemas.microsoft.com/office/drawing/2014/main" id="{3B912517-454C-445B-BE6B-33765FE53AA5}"/>
-              </a:ext>
-            </a:extLst>
-          </p:cNvPr>
-          <p:cNvPicPr>
-            <a:picLocks noChangeAspect="1" noChangeArrowheads="1"/>
-          </p:cNvPicPr>
-          <p:nvPr/>
-        </p:nvPicPr>
-        <p:blipFill>
-          <a:blip r:embed="rId2">
-            <a:extLst>
-              <a:ext uri="{28A0092B-C50C-407E-A947-70E740481C1C}">
-                <a14:useLocalDpi xmlns:a14="http://schemas.microsoft.com/office/drawing/2010/main" val="0"/>
-              </a:ext>
-            </a:extLst>
-          </a:blip>
-          <a:srcRect/>
-          <a:stretch>
-            <a:fillRect/>
-          </a:stretch>
-        </p:blipFill>
-        <p:spPr bwMode="auto">
-          <a:xfrm>
-            <a:off x="304800" y="1066800"/>
-            <a:ext cx="7748588" cy="4343400"/>
-          </a:xfrm>
-          <a:prstGeom prst="rect">
-            <a:avLst/>
-          </a:prstGeom>
-          <a:noFill/>
-          <a:ln>
-            <a:noFill/>
-          </a:ln>
-          <a:extLst>
-            <a:ext uri="{909E8E84-426E-40DD-AFC4-6F175D3DCCD1}">
-              <a14:hiddenFill xmlns:a14="http://schemas.microsoft.com/office/drawing/2010/main">
-                <a:solidFill>
-                  <a:srgbClr val="FFFFFF"/>
-                </a:solidFill>
-              </a14:hiddenFill>
-            </a:ext>
-            <a:ext uri="{91240B29-F687-4F45-9708-019B960494DF}">
-              <a14:hiddenLine xmlns:a14="http://schemas.microsoft.com/office/drawing/2010/main" w="9525">
-                <a:solidFill>
-                  <a:srgbClr val="000000"/>
-                </a:solidFill>
-                <a:miter lim="800000"/>
-                <a:headEnd/>
-                <a:tailEnd/>
-              </a14:hiddenLine>
-            </a:ext>
-          </a:extLst>
-        </p:spPr>
-      </p:pic>
-      <p:cxnSp>
-        <p:nvCxnSpPr>
-          <p:cNvPr id="9" name="Straight Arrow Connector 8">
-            <a:extLst>
-              <a:ext uri="{FF2B5EF4-FFF2-40B4-BE49-F238E27FC236}">
-                <a16:creationId xmlns:a16="http://schemas.microsoft.com/office/drawing/2014/main" id="{392350A0-9339-4437-803A-72CFCE4BB6E8}"/>
-              </a:ext>
-            </a:extLst>
-          </p:cNvPr>
-          <p:cNvCxnSpPr/>
-          <p:nvPr/>
-        </p:nvCxnSpPr>
-        <p:spPr>
-          <a:xfrm flipH="1" flipV="1">
-            <a:off x="4876800" y="2209800"/>
-            <a:ext cx="1524000" cy="457200"/>
-          </a:xfrm>
-          <a:prstGeom prst="straightConnector1">
-            <a:avLst/>
-          </a:prstGeom>
-          <a:ln>
-            <a:tailEnd type="arrow"/>
-          </a:ln>
-        </p:spPr>
-        <p:style>
-          <a:lnRef idx="1">
-            <a:schemeClr val="accent1"/>
-          </a:lnRef>
-          <a:fillRef idx="0">
-            <a:schemeClr val="accent1"/>
-          </a:fillRef>
-          <a:effectRef idx="0">
-            <a:schemeClr val="accent1"/>
-          </a:effectRef>
-          <a:fontRef idx="minor">
-            <a:schemeClr val="tx1"/>
-          </a:fontRef>
-        </p:style>
-      </p:cxnSp>
-      <p:sp>
-        <p:nvSpPr>
-          <p:cNvPr id="17413" name="TextBox 9">
-            <a:extLst>
-              <a:ext uri="{FF2B5EF4-FFF2-40B4-BE49-F238E27FC236}">
-                <a16:creationId xmlns:a16="http://schemas.microsoft.com/office/drawing/2014/main" id="{AEAD6328-F7B0-4D81-8F67-0A81818F5BBE}"/>
-              </a:ext>
-            </a:extLst>
-          </p:cNvPr>
-          <p:cNvSpPr txBox="1">
-            <a:spLocks noChangeArrowheads="1"/>
-          </p:cNvSpPr>
-          <p:nvPr/>
-        </p:nvSpPr>
-        <p:spPr bwMode="auto">
-          <a:xfrm flipH="1">
-            <a:off x="6324600" y="2514600"/>
-            <a:ext cx="3078163" cy="584200"/>
-          </a:xfrm>
-          <a:prstGeom prst="rect">
-            <a:avLst/>
-          </a:prstGeom>
-          <a:noFill/>
-          <a:ln>
-            <a:noFill/>
-          </a:ln>
-          <a:extLst>
-            <a:ext uri="{909E8E84-426E-40DD-AFC4-6F175D3DCCD1}">
-              <a14:hiddenFill xmlns:a14="http://schemas.microsoft.com/office/drawing/2010/main">
-                <a:solidFill>
-                  <a:srgbClr val="FFFFFF"/>
-                </a:solidFill>
-              </a14:hiddenFill>
-            </a:ext>
-            <a:ext uri="{91240B29-F687-4F45-9708-019B960494DF}">
-              <a14:hiddenLine xmlns:a14="http://schemas.microsoft.com/office/drawing/2010/main" w="9525">
-                <a:solidFill>
-                  <a:srgbClr val="000000"/>
-                </a:solidFill>
-                <a:miter lim="800000"/>
-                <a:headEnd/>
-                <a:tailEnd/>
-              </a14:hiddenLine>
-            </a:ext>
-          </a:extLst>
-        </p:spPr>
-        <p:txBody>
-          <a:bodyPr>
-            <a:spAutoFit/>
-          </a:bodyPr>
-          <a:lstStyle>
-            <a:lvl1pPr>
-              <a:spcBef>
-                <a:spcPct val="20000"/>
-              </a:spcBef>
-              <a:buChar char="•"/>
-              <a:defRPr sz="3200">
-                <a:solidFill>
-                  <a:schemeClr val="tx1"/>
-                </a:solidFill>
-                <a:latin typeface="Times New Roman" panose="02020603050405020304" pitchFamily="18" charset="0"/>
-              </a:defRPr>
-            </a:lvl1pPr>
-            <a:lvl2pPr marL="742950" indent="-285750">
-              <a:spcBef>
-                <a:spcPct val="20000"/>
-              </a:spcBef>
-              <a:buChar char="–"/>
-              <a:defRPr sz="2800">
-                <a:solidFill>
-                  <a:schemeClr val="tx1"/>
-                </a:solidFill>
-                <a:latin typeface="Times New Roman" panose="02020603050405020304" pitchFamily="18" charset="0"/>
-              </a:defRPr>
-            </a:lvl2pPr>
-            <a:lvl3pPr marL="1143000" indent="-228600">
-              <a:spcBef>
-                <a:spcPct val="20000"/>
-              </a:spcBef>
-              <a:buChar char="•"/>
-              <a:defRPr sz="2400">
-                <a:solidFill>
-                  <a:schemeClr val="tx1"/>
-                </a:solidFill>
-                <a:latin typeface="Times New Roman" panose="02020603050405020304" pitchFamily="18" charset="0"/>
-              </a:defRPr>
-            </a:lvl3pPr>
-            <a:lvl4pPr marL="1600200" indent="-228600">
-              <a:spcBef>
-                <a:spcPct val="20000"/>
-              </a:spcBef>
-              <a:buChar char="–"/>
-              <a:defRPr sz="2000">
-                <a:solidFill>
-                  <a:schemeClr val="tx1"/>
-                </a:solidFill>
-                <a:latin typeface="Times New Roman" panose="02020603050405020304" pitchFamily="18" charset="0"/>
-              </a:defRPr>
-            </a:lvl4pPr>
-            <a:lvl5pPr marL="2057400" indent="-228600">
-              <a:spcBef>
-                <a:spcPct val="20000"/>
-              </a:spcBef>
-              <a:buChar char="»"/>
-              <a:defRPr sz="2000">
-                <a:solidFill>
-                  <a:schemeClr val="tx1"/>
-                </a:solidFill>
-                <a:latin typeface="Times New Roman" panose="02020603050405020304" pitchFamily="18" charset="0"/>
-              </a:defRPr>
-            </a:lvl5pPr>
-            <a:lvl6pPr marL="2514600" indent="-228600" eaLnBrk="0" fontAlgn="base" hangingPunct="0">
-              <a:spcBef>
-                <a:spcPct val="20000"/>
-              </a:spcBef>
-              <a:spcAft>
-                <a:spcPct val="0"/>
-              </a:spcAft>
-              <a:buChar char="»"/>
-              <a:defRPr sz="2000">
-                <a:solidFill>
-                  <a:schemeClr val="tx1"/>
-                </a:solidFill>
-                <a:latin typeface="Times New Roman" panose="02020603050405020304" pitchFamily="18" charset="0"/>
-              </a:defRPr>
-            </a:lvl6pPr>
-            <a:lvl7pPr marL="2971800" indent="-228600" eaLnBrk="0" fontAlgn="base" hangingPunct="0">
-              <a:spcBef>
-                <a:spcPct val="20000"/>
-              </a:spcBef>
-              <a:spcAft>
-                <a:spcPct val="0"/>
-              </a:spcAft>
-              <a:buChar char="»"/>
-              <a:defRPr sz="2000">
-                <a:solidFill>
-                  <a:schemeClr val="tx1"/>
-                </a:solidFill>
-                <a:latin typeface="Times New Roman" panose="02020603050405020304" pitchFamily="18" charset="0"/>
-              </a:defRPr>
-            </a:lvl7pPr>
-            <a:lvl8pPr marL="3429000" indent="-228600" eaLnBrk="0" fontAlgn="base" hangingPunct="0">
-              <a:spcBef>
-                <a:spcPct val="20000"/>
-              </a:spcBef>
-              <a:spcAft>
-                <a:spcPct val="0"/>
-              </a:spcAft>
-              <a:buChar char="»"/>
-              <a:defRPr sz="2000">
-                <a:solidFill>
-                  <a:schemeClr val="tx1"/>
-                </a:solidFill>
-                <a:latin typeface="Times New Roman" panose="02020603050405020304" pitchFamily="18" charset="0"/>
-              </a:defRPr>
-            </a:lvl8pPr>
-            <a:lvl9pPr marL="3886200" indent="-228600" eaLnBrk="0" fontAlgn="base" hangingPunct="0">
-              <a:spcBef>
-                <a:spcPct val="20000"/>
-              </a:spcBef>
-              <a:spcAft>
-                <a:spcPct val="0"/>
-              </a:spcAft>
-              <a:buChar char="»"/>
-              <a:defRPr sz="2000">
-                <a:solidFill>
-                  <a:schemeClr val="tx1"/>
-                </a:solidFill>
-                <a:latin typeface="Times New Roman" panose="02020603050405020304" pitchFamily="18" charset="0"/>
-              </a:defRPr>
-            </a:lvl9pPr>
-          </a:lstStyle>
-          <a:p>
-            <a:pPr eaLnBrk="1" hangingPunct="1">
-              <a:spcBef>
-                <a:spcPct val="0"/>
-              </a:spcBef>
-              <a:buFontTx/>
-              <a:buNone/>
-            </a:pPr>
-            <a:r>
-              <a:rPr lang="en-US" altLang="en-US" sz="1600"/>
-              <a:t>Our TreeMap keeps our keys ordered…</a:t>
-            </a:r>
-          </a:p>
-        </p:txBody>
-      </p:sp>
       <p:cxnSp>
         <p:nvCxnSpPr>
           <p:cNvPr id="12" name="Straight Arrow Connector 11">
@@ -6496,7 +6240,7 @@
         </p:nvCxnSpPr>
         <p:spPr>
           <a:xfrm flipH="1">
-            <a:off x="3124200" y="3429000"/>
+            <a:off x="3200400" y="3225800"/>
             <a:ext cx="533400" cy="0"/>
           </a:xfrm>
           <a:prstGeom prst="straightConnector1">
@@ -6537,7 +6281,7 @@
         </p:nvSpPr>
         <p:spPr bwMode="auto">
           <a:xfrm>
-            <a:off x="3713163" y="3200400"/>
+            <a:off x="3789363" y="2997200"/>
             <a:ext cx="3449637" cy="584200"/>
           </a:xfrm>
           <a:prstGeom prst="rect">
@@ -6702,7 +6446,7 @@
               <a:buNone/>
             </a:pPr>
             <a:r>
-              <a:rPr lang="en-US" altLang="en-US" sz="1600"/>
+              <a:rPr lang="en-US" altLang="en-US" sz="1600" dirty="0"/>
               <a:t>Maps only hold objects (not primitives)</a:t>
             </a:r>
           </a:p>
@@ -6715,7 +6459,7 @@
               <a:buNone/>
             </a:pPr>
             <a:r>
-              <a:rPr lang="en-US" altLang="en-US" sz="1600"/>
+              <a:rPr lang="en-US" altLang="en-US" sz="1600" dirty="0"/>
               <a:t>So we have this awkward switch</a:t>
             </a:r>
           </a:p>
@@ -6723,35 +6467,91 @@
       </p:sp>
       <p:pic>
         <p:nvPicPr>
-          <p:cNvPr id="17416" name="Picture 3">
+          <p:cNvPr id="3" name="Picture 2">
             <a:extLst>
               <a:ext uri="{FF2B5EF4-FFF2-40B4-BE49-F238E27FC236}">
-                <a16:creationId xmlns:a16="http://schemas.microsoft.com/office/drawing/2014/main" id="{D77DDF0E-0000-4849-A889-CA32B0B216CB}"/>
+                <a16:creationId xmlns:a16="http://schemas.microsoft.com/office/drawing/2014/main" id="{BD362C01-101E-4649-990F-4BD40810DC66}"/>
               </a:ext>
             </a:extLst>
           </p:cNvPr>
           <p:cNvPicPr>
-            <a:picLocks noChangeAspect="1" noChangeArrowheads="1"/>
+            <a:picLocks noChangeAspect="1"/>
           </p:cNvPicPr>
           <p:nvPr/>
         </p:nvPicPr>
         <p:blipFill>
-          <a:blip r:embed="rId3">
-            <a:extLst>
-              <a:ext uri="{28A0092B-C50C-407E-A947-70E740481C1C}">
-                <a14:useLocalDpi xmlns:a14="http://schemas.microsoft.com/office/drawing/2010/main" val="0"/>
-              </a:ext>
-            </a:extLst>
-          </a:blip>
-          <a:srcRect/>
+          <a:blip r:embed="rId3"/>
           <a:stretch>
             <a:fillRect/>
           </a:stretch>
         </p:blipFill>
+        <p:spPr>
+          <a:xfrm>
+            <a:off x="547211" y="5333999"/>
+            <a:ext cx="4011946" cy="628133"/>
+          </a:xfrm>
+          <a:prstGeom prst="rect">
+            <a:avLst/>
+          </a:prstGeom>
+        </p:spPr>
+      </p:pic>
+      <p:cxnSp>
+        <p:nvCxnSpPr>
+          <p:cNvPr id="11" name="Straight Arrow Connector 10">
+            <a:extLst>
+              <a:ext uri="{FF2B5EF4-FFF2-40B4-BE49-F238E27FC236}">
+                <a16:creationId xmlns:a16="http://schemas.microsoft.com/office/drawing/2014/main" id="{CCACC99B-B07A-48E6-95C5-748CFD18FA2C}"/>
+              </a:ext>
+            </a:extLst>
+          </p:cNvPr>
+          <p:cNvCxnSpPr/>
+          <p:nvPr/>
+        </p:nvCxnSpPr>
+        <p:spPr>
+          <a:xfrm flipH="1">
+            <a:off x="4343400" y="5486400"/>
+            <a:ext cx="533400" cy="0"/>
+          </a:xfrm>
+          <a:prstGeom prst="straightConnector1">
+            <a:avLst/>
+          </a:prstGeom>
+          <a:ln>
+            <a:tailEnd type="arrow"/>
+          </a:ln>
+        </p:spPr>
+        <p:style>
+          <a:lnRef idx="1">
+            <a:schemeClr val="accent1"/>
+          </a:lnRef>
+          <a:fillRef idx="0">
+            <a:schemeClr val="accent1"/>
+          </a:fillRef>
+          <a:effectRef idx="0">
+            <a:schemeClr val="accent1"/>
+          </a:effectRef>
+          <a:fontRef idx="minor">
+            <a:schemeClr val="tx1"/>
+          </a:fontRef>
+        </p:style>
+      </p:cxnSp>
+      <p:sp>
+        <p:nvSpPr>
+          <p:cNvPr id="13" name="TextBox 12">
+            <a:extLst>
+              <a:ext uri="{FF2B5EF4-FFF2-40B4-BE49-F238E27FC236}">
+                <a16:creationId xmlns:a16="http://schemas.microsoft.com/office/drawing/2014/main" id="{FBAD784E-675F-4091-B1CE-2BC9EE2E7765}"/>
+              </a:ext>
+            </a:extLst>
+          </p:cNvPr>
+          <p:cNvSpPr txBox="1">
+            <a:spLocks noChangeArrowheads="1"/>
+          </p:cNvSpPr>
+          <p:nvPr/>
+        </p:nvSpPr>
         <p:spPr bwMode="auto">
           <a:xfrm>
-            <a:off x="2209800" y="5562600"/>
-            <a:ext cx="4183063" cy="609600"/>
+            <a:off x="4932363" y="5257800"/>
+            <a:ext cx="2999539" cy="584775"/>
           </a:xfrm>
           <a:prstGeom prst="rect">
             <a:avLst/>
@@ -6780,7 +6580,164 @@
             </a:ext>
           </a:extLst>
         </p:spPr>
-      </p:pic>
+        <p:txBody>
+          <a:bodyPr wrap="none">
+            <a:spAutoFit/>
+          </a:bodyPr>
+          <a:lstStyle>
+            <a:lvl1pPr>
+              <a:spcBef>
+                <a:spcPct val="20000"/>
+              </a:spcBef>
+              <a:buChar char="•"/>
+              <a:defRPr sz="3200">
+                <a:solidFill>
+                  <a:schemeClr val="tx1"/>
+                </a:solidFill>
+                <a:latin typeface="Times New Roman" panose="02020603050405020304" pitchFamily="18" charset="0"/>
+              </a:defRPr>
+            </a:lvl1pPr>
+            <a:lvl2pPr marL="742950" indent="-285750">
+              <a:spcBef>
+                <a:spcPct val="20000"/>
+              </a:spcBef>
+              <a:buChar char="–"/>
+              <a:defRPr sz="2800">
+                <a:solidFill>
+                  <a:schemeClr val="tx1"/>
+                </a:solidFill>
+                <a:latin typeface="Times New Roman" panose="02020603050405020304" pitchFamily="18" charset="0"/>
+              </a:defRPr>
+            </a:lvl2pPr>
+            <a:lvl3pPr marL="1143000" indent="-228600">
+              <a:spcBef>
+                <a:spcPct val="20000"/>
+              </a:spcBef>
+              <a:buChar char="•"/>
+              <a:defRPr sz="2400">
+                <a:solidFill>
+                  <a:schemeClr val="tx1"/>
+                </a:solidFill>
+                <a:latin typeface="Times New Roman" panose="02020603050405020304" pitchFamily="18" charset="0"/>
+              </a:defRPr>
+            </a:lvl3pPr>
+            <a:lvl4pPr marL="1600200" indent="-228600">
+              <a:spcBef>
+                <a:spcPct val="20000"/>
+              </a:spcBef>
+              <a:buChar char="–"/>
+              <a:defRPr sz="2000">
+                <a:solidFill>
+                  <a:schemeClr val="tx1"/>
+                </a:solidFill>
+                <a:latin typeface="Times New Roman" panose="02020603050405020304" pitchFamily="18" charset="0"/>
+              </a:defRPr>
+            </a:lvl4pPr>
+            <a:lvl5pPr marL="2057400" indent="-228600">
+              <a:spcBef>
+                <a:spcPct val="20000"/>
+              </a:spcBef>
+              <a:buChar char="»"/>
+              <a:defRPr sz="2000">
+                <a:solidFill>
+                  <a:schemeClr val="tx1"/>
+                </a:solidFill>
+                <a:latin typeface="Times New Roman" panose="02020603050405020304" pitchFamily="18" charset="0"/>
+              </a:defRPr>
+            </a:lvl5pPr>
+            <a:lvl6pPr marL="2514600" indent="-228600" eaLnBrk="0" fontAlgn="base" hangingPunct="0">
+              <a:spcBef>
+                <a:spcPct val="20000"/>
+              </a:spcBef>
+              <a:spcAft>
+                <a:spcPct val="0"/>
+              </a:spcAft>
+              <a:buChar char="»"/>
+              <a:defRPr sz="2000">
+                <a:solidFill>
+                  <a:schemeClr val="tx1"/>
+                </a:solidFill>
+                <a:latin typeface="Times New Roman" panose="02020603050405020304" pitchFamily="18" charset="0"/>
+              </a:defRPr>
+            </a:lvl6pPr>
+            <a:lvl7pPr marL="2971800" indent="-228600" eaLnBrk="0" fontAlgn="base" hangingPunct="0">
+              <a:spcBef>
+                <a:spcPct val="20000"/>
+              </a:spcBef>
+              <a:spcAft>
+                <a:spcPct val="0"/>
+              </a:spcAft>
+              <a:buChar char="»"/>
+              <a:defRPr sz="2000">
+                <a:solidFill>
+                  <a:schemeClr val="tx1"/>
+                </a:solidFill>
+                <a:latin typeface="Times New Roman" panose="02020603050405020304" pitchFamily="18" charset="0"/>
+              </a:defRPr>
+            </a:lvl7pPr>
+            <a:lvl8pPr marL="3429000" indent="-228600" eaLnBrk="0" fontAlgn="base" hangingPunct="0">
+              <a:spcBef>
+                <a:spcPct val="20000"/>
+              </a:spcBef>
+              <a:spcAft>
+                <a:spcPct val="0"/>
+              </a:spcAft>
+              <a:buChar char="»"/>
+              <a:defRPr sz="2000">
+                <a:solidFill>
+                  <a:schemeClr val="tx1"/>
+                </a:solidFill>
+                <a:latin typeface="Times New Roman" panose="02020603050405020304" pitchFamily="18" charset="0"/>
+              </a:defRPr>
+            </a:lvl8pPr>
+            <a:lvl9pPr marL="3886200" indent="-228600" eaLnBrk="0" fontAlgn="base" hangingPunct="0">
+              <a:spcBef>
+                <a:spcPct val="20000"/>
+              </a:spcBef>
+              <a:spcAft>
+                <a:spcPct val="0"/>
+              </a:spcAft>
+              <a:buChar char="»"/>
+              <a:defRPr sz="2000">
+                <a:solidFill>
+                  <a:schemeClr val="tx1"/>
+                </a:solidFill>
+                <a:latin typeface="Times New Roman" panose="02020603050405020304" pitchFamily="18" charset="0"/>
+              </a:defRPr>
+            </a:lvl9pPr>
+          </a:lstStyle>
+          <a:p>
+            <a:pPr eaLnBrk="1" hangingPunct="1">
+              <a:spcBef>
+                <a:spcPct val="0"/>
+              </a:spcBef>
+              <a:buFontTx/>
+              <a:buNone/>
+            </a:pPr>
+            <a:r>
+              <a:rPr lang="en-US" altLang="en-US" sz="1600" dirty="0" err="1"/>
+              <a:t>HashMaps</a:t>
+            </a:r>
+            <a:r>
+              <a:rPr lang="en-US" altLang="en-US" sz="1600" dirty="0"/>
+              <a:t> are not ordered, so the </a:t>
+            </a:r>
+          </a:p>
+          <a:p>
+            <a:pPr eaLnBrk="1" hangingPunct="1">
+              <a:spcBef>
+                <a:spcPct val="0"/>
+              </a:spcBef>
+              <a:buFontTx/>
+              <a:buNone/>
+            </a:pPr>
+            <a:r>
+              <a:rPr lang="en-US" altLang="en-US" sz="1600" dirty="0"/>
+              <a:t>order of the keys is arbitrary</a:t>
+            </a:r>
+          </a:p>
+        </p:txBody>
+      </p:sp>
     </p:spTree>
   </p:cSld>
   <p:clrMapOvr>

</xml_diff>